<commit_message>
update figures for science
</commit_message>
<xml_diff>
--- a/outputs/00_Figures_for_paper/Figure3.pptx
+++ b/outputs/00_Figures_for_paper/Figure3.pptx
@@ -244,7 +244,7 @@
           <a:p>
             <a:fld id="{CF97A134-FB87-44B0-94D1-6D4AE8ED7871}" type="datetimeFigureOut">
               <a:rPr lang="fr-FR" smtClean="0"/>
-              <a:t>09/09/2020</a:t>
+              <a:t>21/09/2020</a:t>
             </a:fld>
             <a:endParaRPr lang="fr-FR"/>
           </a:p>
@@ -414,7 +414,7 @@
           <a:p>
             <a:fld id="{CF97A134-FB87-44B0-94D1-6D4AE8ED7871}" type="datetimeFigureOut">
               <a:rPr lang="fr-FR" smtClean="0"/>
-              <a:t>09/09/2020</a:t>
+              <a:t>21/09/2020</a:t>
             </a:fld>
             <a:endParaRPr lang="fr-FR"/>
           </a:p>
@@ -594,7 +594,7 @@
           <a:p>
             <a:fld id="{CF97A134-FB87-44B0-94D1-6D4AE8ED7871}" type="datetimeFigureOut">
               <a:rPr lang="fr-FR" smtClean="0"/>
-              <a:t>09/09/2020</a:t>
+              <a:t>21/09/2020</a:t>
             </a:fld>
             <a:endParaRPr lang="fr-FR"/>
           </a:p>
@@ -764,7 +764,7 @@
           <a:p>
             <a:fld id="{CF97A134-FB87-44B0-94D1-6D4AE8ED7871}" type="datetimeFigureOut">
               <a:rPr lang="fr-FR" smtClean="0"/>
-              <a:t>09/09/2020</a:t>
+              <a:t>21/09/2020</a:t>
             </a:fld>
             <a:endParaRPr lang="fr-FR"/>
           </a:p>
@@ -1008,7 +1008,7 @@
           <a:p>
             <a:fld id="{CF97A134-FB87-44B0-94D1-6D4AE8ED7871}" type="datetimeFigureOut">
               <a:rPr lang="fr-FR" smtClean="0"/>
-              <a:t>09/09/2020</a:t>
+              <a:t>21/09/2020</a:t>
             </a:fld>
             <a:endParaRPr lang="fr-FR"/>
           </a:p>
@@ -1240,7 +1240,7 @@
           <a:p>
             <a:fld id="{CF97A134-FB87-44B0-94D1-6D4AE8ED7871}" type="datetimeFigureOut">
               <a:rPr lang="fr-FR" smtClean="0"/>
-              <a:t>09/09/2020</a:t>
+              <a:t>21/09/2020</a:t>
             </a:fld>
             <a:endParaRPr lang="fr-FR"/>
           </a:p>
@@ -1607,7 +1607,7 @@
           <a:p>
             <a:fld id="{CF97A134-FB87-44B0-94D1-6D4AE8ED7871}" type="datetimeFigureOut">
               <a:rPr lang="fr-FR" smtClean="0"/>
-              <a:t>09/09/2020</a:t>
+              <a:t>21/09/2020</a:t>
             </a:fld>
             <a:endParaRPr lang="fr-FR"/>
           </a:p>
@@ -1725,7 +1725,7 @@
           <a:p>
             <a:fld id="{CF97A134-FB87-44B0-94D1-6D4AE8ED7871}" type="datetimeFigureOut">
               <a:rPr lang="fr-FR" smtClean="0"/>
-              <a:t>09/09/2020</a:t>
+              <a:t>21/09/2020</a:t>
             </a:fld>
             <a:endParaRPr lang="fr-FR"/>
           </a:p>
@@ -1820,7 +1820,7 @@
           <a:p>
             <a:fld id="{CF97A134-FB87-44B0-94D1-6D4AE8ED7871}" type="datetimeFigureOut">
               <a:rPr lang="fr-FR" smtClean="0"/>
-              <a:t>09/09/2020</a:t>
+              <a:t>21/09/2020</a:t>
             </a:fld>
             <a:endParaRPr lang="fr-FR"/>
           </a:p>
@@ -2097,7 +2097,7 @@
           <a:p>
             <a:fld id="{CF97A134-FB87-44B0-94D1-6D4AE8ED7871}" type="datetimeFigureOut">
               <a:rPr lang="fr-FR" smtClean="0"/>
-              <a:t>09/09/2020</a:t>
+              <a:t>21/09/2020</a:t>
             </a:fld>
             <a:endParaRPr lang="fr-FR"/>
           </a:p>
@@ -2354,7 +2354,7 @@
           <a:p>
             <a:fld id="{CF97A134-FB87-44B0-94D1-6D4AE8ED7871}" type="datetimeFigureOut">
               <a:rPr lang="fr-FR" smtClean="0"/>
-              <a:t>09/09/2020</a:t>
+              <a:t>21/09/2020</a:t>
             </a:fld>
             <a:endParaRPr lang="fr-FR"/>
           </a:p>
@@ -2567,7 +2567,7 @@
           <a:p>
             <a:fld id="{CF97A134-FB87-44B0-94D1-6D4AE8ED7871}" type="datetimeFigureOut">
               <a:rPr lang="fr-FR" smtClean="0"/>
-              <a:t>09/09/2020</a:t>
+              <a:t>21/09/2020</a:t>
             </a:fld>
             <a:endParaRPr lang="fr-FR"/>
           </a:p>
@@ -4103,8 +4103,8 @@
                         </a:p>
                       </p:txBody>
                     </p:sp>
-                    <mc:AlternateContent xmlns:mc="http://schemas.openxmlformats.org/markup-compatibility/2006">
-                      <mc:Choice xmlns:a14="http://schemas.microsoft.com/office/drawing/2010/main" Requires="a14">
+                    <mc:AlternateContent xmlns:mc="http://schemas.openxmlformats.org/markup-compatibility/2006" xmlns:a14="http://schemas.microsoft.com/office/drawing/2010/main">
+                      <mc:Choice Requires="a14">
                         <p:sp>
                           <p:nvSpPr>
                             <p:cNvPr id="30" name="ZoneTexte 29"/>
@@ -4171,7 +4171,7 @@
                           </p:txBody>
                         </p:sp>
                       </mc:Choice>
-                      <mc:Fallback>
+                      <mc:Fallback xmlns="">
                         <p:sp>
                           <p:nvSpPr>
                             <p:cNvPr id="30" name="ZoneTexte 29"/>
@@ -4210,8 +4210,8 @@
                         </p:sp>
                       </mc:Fallback>
                     </mc:AlternateContent>
-                    <mc:AlternateContent xmlns:mc="http://schemas.openxmlformats.org/markup-compatibility/2006">
-                      <mc:Choice xmlns:a14="http://schemas.microsoft.com/office/drawing/2010/main" Requires="a14">
+                    <mc:AlternateContent xmlns:mc="http://schemas.openxmlformats.org/markup-compatibility/2006" xmlns:a14="http://schemas.microsoft.com/office/drawing/2010/main">
+                      <mc:Choice Requires="a14">
                         <p:sp>
                           <p:nvSpPr>
                             <p:cNvPr id="31" name="ZoneTexte 30"/>
@@ -4290,7 +4290,7 @@
                           </p:txBody>
                         </p:sp>
                       </mc:Choice>
-                      <mc:Fallback>
+                      <mc:Fallback xmlns="">
                         <p:sp>
                           <p:nvSpPr>
                             <p:cNvPr id="31" name="ZoneTexte 30"/>
@@ -4329,8 +4329,8 @@
                         </p:sp>
                       </mc:Fallback>
                     </mc:AlternateContent>
-                    <mc:AlternateContent xmlns:mc="http://schemas.openxmlformats.org/markup-compatibility/2006">
-                      <mc:Choice xmlns:a14="http://schemas.microsoft.com/office/drawing/2010/main" Requires="a14">
+                    <mc:AlternateContent xmlns:mc="http://schemas.openxmlformats.org/markup-compatibility/2006" xmlns:a14="http://schemas.microsoft.com/office/drawing/2010/main">
+                      <mc:Choice Requires="a14">
                         <p:sp>
                           <p:nvSpPr>
                             <p:cNvPr id="32" name="ZoneTexte 31"/>
@@ -4409,7 +4409,7 @@
                           </p:txBody>
                         </p:sp>
                       </mc:Choice>
-                      <mc:Fallback>
+                      <mc:Fallback xmlns="">
                         <p:sp>
                           <p:nvSpPr>
                             <p:cNvPr id="32" name="ZoneTexte 31"/>
@@ -4448,8 +4448,8 @@
                         </p:sp>
                       </mc:Fallback>
                     </mc:AlternateContent>
-                    <mc:AlternateContent xmlns:mc="http://schemas.openxmlformats.org/markup-compatibility/2006">
-                      <mc:Choice xmlns:a14="http://schemas.microsoft.com/office/drawing/2010/main" Requires="a14">
+                    <mc:AlternateContent xmlns:mc="http://schemas.openxmlformats.org/markup-compatibility/2006" xmlns:a14="http://schemas.microsoft.com/office/drawing/2010/main">
+                      <mc:Choice Requires="a14">
                         <p:sp>
                           <p:nvSpPr>
                             <p:cNvPr id="33" name="ZoneTexte 32"/>
@@ -4511,7 +4511,7 @@
                           </p:txBody>
                         </p:sp>
                       </mc:Choice>
-                      <mc:Fallback>
+                      <mc:Fallback xmlns="">
                         <p:sp>
                           <p:nvSpPr>
                             <p:cNvPr id="33" name="ZoneTexte 32"/>
@@ -4698,8 +4698,8 @@
                 </p:txBody>
               </p:sp>
             </p:grpSp>
-            <mc:AlternateContent xmlns:mc="http://schemas.openxmlformats.org/markup-compatibility/2006">
-              <mc:Choice xmlns:a14="http://schemas.microsoft.com/office/drawing/2010/main" Requires="a14">
+            <mc:AlternateContent xmlns:mc="http://schemas.openxmlformats.org/markup-compatibility/2006" xmlns:a14="http://schemas.microsoft.com/office/drawing/2010/main">
+              <mc:Choice Requires="a14">
                 <p:sp>
                   <p:nvSpPr>
                     <p:cNvPr id="49" name="ZoneTexte 48"/>
@@ -4795,7 +4795,7 @@
                   </p:txBody>
                 </p:sp>
               </mc:Choice>
-              <mc:Fallback>
+              <mc:Fallback xmlns="">
                 <p:sp>
                   <p:nvSpPr>
                     <p:cNvPr id="49" name="ZoneTexte 48"/>
@@ -4834,8 +4834,8 @@
                 </p:sp>
               </mc:Fallback>
             </mc:AlternateContent>
-            <mc:AlternateContent xmlns:mc="http://schemas.openxmlformats.org/markup-compatibility/2006">
-              <mc:Choice xmlns:a14="http://schemas.microsoft.com/office/drawing/2010/main" Requires="a14">
+            <mc:AlternateContent xmlns:mc="http://schemas.openxmlformats.org/markup-compatibility/2006" xmlns:a14="http://schemas.microsoft.com/office/drawing/2010/main">
+              <mc:Choice Requires="a14">
                 <p:sp>
                   <p:nvSpPr>
                     <p:cNvPr id="50" name="ZoneTexte 49"/>
@@ -4944,7 +4944,7 @@
                   </p:txBody>
                 </p:sp>
               </mc:Choice>
-              <mc:Fallback>
+              <mc:Fallback xmlns="">
                 <p:sp>
                   <p:nvSpPr>
                     <p:cNvPr id="50" name="ZoneTexte 49"/>
@@ -4983,8 +4983,8 @@
                 </p:sp>
               </mc:Fallback>
             </mc:AlternateContent>
-            <mc:AlternateContent xmlns:mc="http://schemas.openxmlformats.org/markup-compatibility/2006">
-              <mc:Choice xmlns:a14="http://schemas.microsoft.com/office/drawing/2010/main" Requires="a14">
+            <mc:AlternateContent xmlns:mc="http://schemas.openxmlformats.org/markup-compatibility/2006" xmlns:a14="http://schemas.microsoft.com/office/drawing/2010/main">
+              <mc:Choice Requires="a14">
                 <p:sp>
                   <p:nvSpPr>
                     <p:cNvPr id="51" name="ZoneTexte 50"/>
@@ -5093,7 +5093,7 @@
                   </p:txBody>
                 </p:sp>
               </mc:Choice>
-              <mc:Fallback>
+              <mc:Fallback xmlns="">
                 <p:sp>
                   <p:nvSpPr>
                     <p:cNvPr id="51" name="ZoneTexte 50"/>
@@ -5132,8 +5132,8 @@
                 </p:sp>
               </mc:Fallback>
             </mc:AlternateContent>
-            <mc:AlternateContent xmlns:mc="http://schemas.openxmlformats.org/markup-compatibility/2006">
-              <mc:Choice xmlns:a14="http://schemas.microsoft.com/office/drawing/2010/main" Requires="a14">
+            <mc:AlternateContent xmlns:mc="http://schemas.openxmlformats.org/markup-compatibility/2006" xmlns:a14="http://schemas.microsoft.com/office/drawing/2010/main">
+              <mc:Choice Requires="a14">
                 <p:sp>
                   <p:nvSpPr>
                     <p:cNvPr id="52" name="ZoneTexte 51"/>
@@ -5242,7 +5242,7 @@
                   </p:txBody>
                 </p:sp>
               </mc:Choice>
-              <mc:Fallback>
+              <mc:Fallback xmlns="">
                 <p:sp>
                   <p:nvSpPr>
                     <p:cNvPr id="52" name="ZoneTexte 51"/>
@@ -5281,8 +5281,8 @@
                 </p:sp>
               </mc:Fallback>
             </mc:AlternateContent>
-            <mc:AlternateContent xmlns:mc="http://schemas.openxmlformats.org/markup-compatibility/2006">
-              <mc:Choice xmlns:a14="http://schemas.microsoft.com/office/drawing/2010/main" Requires="a14">
+            <mc:AlternateContent xmlns:mc="http://schemas.openxmlformats.org/markup-compatibility/2006" xmlns:a14="http://schemas.microsoft.com/office/drawing/2010/main">
+              <mc:Choice Requires="a14">
                 <p:sp>
                   <p:nvSpPr>
                     <p:cNvPr id="53" name="ZoneTexte 52"/>
@@ -5391,7 +5391,7 @@
                   </p:txBody>
                 </p:sp>
               </mc:Choice>
-              <mc:Fallback>
+              <mc:Fallback xmlns="">
                 <p:sp>
                   <p:nvSpPr>
                     <p:cNvPr id="53" name="ZoneTexte 52"/>
@@ -5526,7 +5526,7 @@
                     <a:latin typeface="Arial" panose="020B0604020202020204" pitchFamily="34" charset="0"/>
                     <a:cs typeface="Arial" panose="020B0604020202020204" pitchFamily="34" charset="0"/>
                   </a:rPr>
-                  <a:t>a</a:t>
+                  <a:t>A</a:t>
                 </a:r>
                 <a:endParaRPr lang="fr-FR" b="1" dirty="0">
                   <a:latin typeface="Arial" panose="020B0604020202020204" pitchFamily="34" charset="0"/>
@@ -5558,11 +5558,11 @@
               <a:lstStyle/>
               <a:p>
                 <a:r>
-                  <a:rPr lang="fr-FR" b="1" dirty="0" smtClean="0">
+                  <a:rPr lang="fr-FR" b="1" dirty="0">
                     <a:latin typeface="Arial" panose="020B0604020202020204" pitchFamily="34" charset="0"/>
                     <a:cs typeface="Arial" panose="020B0604020202020204" pitchFamily="34" charset="0"/>
                   </a:rPr>
-                  <a:t>b</a:t>
+                  <a:t>B</a:t>
                 </a:r>
                 <a:endParaRPr lang="fr-FR" b="1" dirty="0">
                   <a:latin typeface="Arial" panose="020B0604020202020204" pitchFamily="34" charset="0"/>

</xml_diff>

<commit_message>
update scripts for new data
</commit_message>
<xml_diff>
--- a/outputs/00_Figures_for_paper/Figure3.pptx
+++ b/outputs/00_Figures_for_paper/Figure3.pptx
@@ -243,7 +243,7 @@
           <a:p>
             <a:fld id="{CF97A134-FB87-44B0-94D1-6D4AE8ED7871}" type="datetimeFigureOut">
               <a:rPr lang="fr-FR" smtClean="0"/>
-              <a:t>08/03/2021</a:t>
+              <a:t>11/03/2021</a:t>
             </a:fld>
             <a:endParaRPr lang="fr-FR"/>
           </a:p>
@@ -413,7 +413,7 @@
           <a:p>
             <a:fld id="{CF97A134-FB87-44B0-94D1-6D4AE8ED7871}" type="datetimeFigureOut">
               <a:rPr lang="fr-FR" smtClean="0"/>
-              <a:t>08/03/2021</a:t>
+              <a:t>11/03/2021</a:t>
             </a:fld>
             <a:endParaRPr lang="fr-FR"/>
           </a:p>
@@ -593,7 +593,7 @@
           <a:p>
             <a:fld id="{CF97A134-FB87-44B0-94D1-6D4AE8ED7871}" type="datetimeFigureOut">
               <a:rPr lang="fr-FR" smtClean="0"/>
-              <a:t>08/03/2021</a:t>
+              <a:t>11/03/2021</a:t>
             </a:fld>
             <a:endParaRPr lang="fr-FR"/>
           </a:p>
@@ -763,7 +763,7 @@
           <a:p>
             <a:fld id="{CF97A134-FB87-44B0-94D1-6D4AE8ED7871}" type="datetimeFigureOut">
               <a:rPr lang="fr-FR" smtClean="0"/>
-              <a:t>08/03/2021</a:t>
+              <a:t>11/03/2021</a:t>
             </a:fld>
             <a:endParaRPr lang="fr-FR"/>
           </a:p>
@@ -1007,7 +1007,7 @@
           <a:p>
             <a:fld id="{CF97A134-FB87-44B0-94D1-6D4AE8ED7871}" type="datetimeFigureOut">
               <a:rPr lang="fr-FR" smtClean="0"/>
-              <a:t>08/03/2021</a:t>
+              <a:t>11/03/2021</a:t>
             </a:fld>
             <a:endParaRPr lang="fr-FR"/>
           </a:p>
@@ -1239,7 +1239,7 @@
           <a:p>
             <a:fld id="{CF97A134-FB87-44B0-94D1-6D4AE8ED7871}" type="datetimeFigureOut">
               <a:rPr lang="fr-FR" smtClean="0"/>
-              <a:t>08/03/2021</a:t>
+              <a:t>11/03/2021</a:t>
             </a:fld>
             <a:endParaRPr lang="fr-FR"/>
           </a:p>
@@ -1606,7 +1606,7 @@
           <a:p>
             <a:fld id="{CF97A134-FB87-44B0-94D1-6D4AE8ED7871}" type="datetimeFigureOut">
               <a:rPr lang="fr-FR" smtClean="0"/>
-              <a:t>08/03/2021</a:t>
+              <a:t>11/03/2021</a:t>
             </a:fld>
             <a:endParaRPr lang="fr-FR"/>
           </a:p>
@@ -1724,7 +1724,7 @@
           <a:p>
             <a:fld id="{CF97A134-FB87-44B0-94D1-6D4AE8ED7871}" type="datetimeFigureOut">
               <a:rPr lang="fr-FR" smtClean="0"/>
-              <a:t>08/03/2021</a:t>
+              <a:t>11/03/2021</a:t>
             </a:fld>
             <a:endParaRPr lang="fr-FR"/>
           </a:p>
@@ -1819,7 +1819,7 @@
           <a:p>
             <a:fld id="{CF97A134-FB87-44B0-94D1-6D4AE8ED7871}" type="datetimeFigureOut">
               <a:rPr lang="fr-FR" smtClean="0"/>
-              <a:t>08/03/2021</a:t>
+              <a:t>11/03/2021</a:t>
             </a:fld>
             <a:endParaRPr lang="fr-FR"/>
           </a:p>
@@ -2096,7 +2096,7 @@
           <a:p>
             <a:fld id="{CF97A134-FB87-44B0-94D1-6D4AE8ED7871}" type="datetimeFigureOut">
               <a:rPr lang="fr-FR" smtClean="0"/>
-              <a:t>08/03/2021</a:t>
+              <a:t>11/03/2021</a:t>
             </a:fld>
             <a:endParaRPr lang="fr-FR"/>
           </a:p>
@@ -2353,7 +2353,7 @@
           <a:p>
             <a:fld id="{CF97A134-FB87-44B0-94D1-6D4AE8ED7871}" type="datetimeFigureOut">
               <a:rPr lang="fr-FR" smtClean="0"/>
-              <a:t>08/03/2021</a:t>
+              <a:t>11/03/2021</a:t>
             </a:fld>
             <a:endParaRPr lang="fr-FR"/>
           </a:p>
@@ -2566,7 +2566,7 @@
           <a:p>
             <a:fld id="{CF97A134-FB87-44B0-94D1-6D4AE8ED7871}" type="datetimeFigureOut">
               <a:rPr lang="fr-FR" smtClean="0"/>
-              <a:t>08/03/2021</a:t>
+              <a:t>11/03/2021</a:t>
             </a:fld>
             <a:endParaRPr lang="fr-FR"/>
           </a:p>
@@ -3235,14 +3235,7 @@
                 <a:latin typeface="Arial" panose="020B0604020202020204" pitchFamily="34" charset="0"/>
                 <a:cs typeface="Arial" panose="020B0604020202020204" pitchFamily="34" charset="0"/>
               </a:rPr>
-              <a:t>Tropical SW </a:t>
-            </a:r>
-            <a:r>
-              <a:rPr lang="fr-FR" sz="1400" b="1" dirty="0" smtClean="0">
-                <a:latin typeface="Arial" panose="020B0604020202020204" pitchFamily="34" charset="0"/>
-                <a:cs typeface="Arial" panose="020B0604020202020204" pitchFamily="34" charset="0"/>
-              </a:rPr>
-              <a:t>Pacific</a:t>
+              <a:t>Tropical SW Pacific</a:t>
             </a:r>
             <a:endParaRPr lang="fr-FR" sz="1400" b="1" dirty="0">
               <a:latin typeface="Arial" panose="020B0604020202020204" pitchFamily="34" charset="0"/>
@@ -3421,14 +3414,7 @@
                 <a:latin typeface="Arial" panose="020B0604020202020204" pitchFamily="34" charset="0"/>
                 <a:cs typeface="Arial" panose="020B0604020202020204" pitchFamily="34" charset="0"/>
               </a:rPr>
-              <a:t> </a:t>
-            </a:r>
-            <a:r>
-              <a:rPr lang="fr-FR" sz="1200" i="1" dirty="0" smtClean="0">
-                <a:latin typeface="Arial" panose="020B0604020202020204" pitchFamily="34" charset="0"/>
-                <a:cs typeface="Arial" panose="020B0604020202020204" pitchFamily="34" charset="0"/>
-              </a:rPr>
-              <a:t>sites</a:t>
+              <a:t> sites</a:t>
             </a:r>
           </a:p>
           <a:p>
@@ -3488,11 +3474,25 @@
           <a:p>
             <a:pPr algn="ctr"/>
             <a:r>
+              <a:rPr lang="fr-FR" sz="1200" i="1" dirty="0">
+                <a:latin typeface="Arial" panose="020B0604020202020204" pitchFamily="34" charset="0"/>
+                <a:cs typeface="Arial" panose="020B0604020202020204" pitchFamily="34" charset="0"/>
+              </a:rPr>
+              <a:t>1</a:t>
+            </a:r>
+            <a:r>
               <a:rPr lang="fr-FR" sz="1200" i="1" dirty="0" smtClean="0">
                 <a:latin typeface="Arial" panose="020B0604020202020204" pitchFamily="34" charset="0"/>
                 <a:cs typeface="Arial" panose="020B0604020202020204" pitchFamily="34" charset="0"/>
               </a:rPr>
-              <a:t>48 stations</a:t>
+              <a:t>8 </a:t>
+            </a:r>
+            <a:r>
+              <a:rPr lang="fr-FR" sz="1200" i="1" dirty="0" smtClean="0">
+                <a:latin typeface="Arial" panose="020B0604020202020204" pitchFamily="34" charset="0"/>
+                <a:cs typeface="Arial" panose="020B0604020202020204" pitchFamily="34" charset="0"/>
+              </a:rPr>
+              <a:t>stations</a:t>
             </a:r>
             <a:endParaRPr lang="fr-FR" sz="1200" i="1" dirty="0">
               <a:latin typeface="Arial" panose="020B0604020202020204" pitchFamily="34" charset="0"/>
@@ -3597,14 +3597,7 @@
                 <a:latin typeface="Arial" panose="020B0604020202020204" pitchFamily="34" charset="0"/>
                 <a:cs typeface="Arial" panose="020B0604020202020204" pitchFamily="34" charset="0"/>
               </a:rPr>
-              <a:t> </a:t>
-            </a:r>
-            <a:r>
-              <a:rPr lang="fr-FR" sz="1200" i="1" dirty="0" smtClean="0">
-                <a:latin typeface="Arial" panose="020B0604020202020204" pitchFamily="34" charset="0"/>
-                <a:cs typeface="Arial" panose="020B0604020202020204" pitchFamily="34" charset="0"/>
-              </a:rPr>
-              <a:t>sites</a:t>
+              <a:t> sites</a:t>
             </a:r>
           </a:p>
           <a:p>
@@ -3659,8 +3652,8 @@
           </a:p>
         </p:txBody>
       </p:sp>
-      <mc:AlternateContent xmlns:mc="http://schemas.openxmlformats.org/markup-compatibility/2006">
-        <mc:Choice xmlns:a14="http://schemas.microsoft.com/office/drawing/2010/main" Requires="a14">
+      <mc:AlternateContent xmlns:mc="http://schemas.openxmlformats.org/markup-compatibility/2006" xmlns:a14="http://schemas.microsoft.com/office/drawing/2010/main">
+        <mc:Choice Requires="a14">
           <p:sp>
             <p:nvSpPr>
               <p:cNvPr id="30" name="ZoneTexte 29"/>
@@ -3727,7 +3720,7 @@
             </p:txBody>
           </p:sp>
         </mc:Choice>
-        <mc:Fallback>
+        <mc:Fallback xmlns="">
           <p:sp>
             <p:nvSpPr>
               <p:cNvPr id="30" name="ZoneTexte 29"/>
@@ -3766,8 +3759,8 @@
           </p:sp>
         </mc:Fallback>
       </mc:AlternateContent>
-      <mc:AlternateContent xmlns:mc="http://schemas.openxmlformats.org/markup-compatibility/2006">
-        <mc:Choice xmlns:a14="http://schemas.microsoft.com/office/drawing/2010/main" Requires="a14">
+      <mc:AlternateContent xmlns:mc="http://schemas.openxmlformats.org/markup-compatibility/2006" xmlns:a14="http://schemas.microsoft.com/office/drawing/2010/main">
+        <mc:Choice Requires="a14">
           <p:sp>
             <p:nvSpPr>
               <p:cNvPr id="31" name="ZoneTexte 30"/>
@@ -3846,7 +3839,7 @@
             </p:txBody>
           </p:sp>
         </mc:Choice>
-        <mc:Fallback>
+        <mc:Fallback xmlns="">
           <p:sp>
             <p:nvSpPr>
               <p:cNvPr id="31" name="ZoneTexte 30"/>
@@ -3885,8 +3878,8 @@
           </p:sp>
         </mc:Fallback>
       </mc:AlternateContent>
-      <mc:AlternateContent xmlns:mc="http://schemas.openxmlformats.org/markup-compatibility/2006">
-        <mc:Choice xmlns:a14="http://schemas.microsoft.com/office/drawing/2010/main" Requires="a14">
+      <mc:AlternateContent xmlns:mc="http://schemas.openxmlformats.org/markup-compatibility/2006" xmlns:a14="http://schemas.microsoft.com/office/drawing/2010/main">
+        <mc:Choice Requires="a14">
           <p:sp>
             <p:nvSpPr>
               <p:cNvPr id="32" name="ZoneTexte 31"/>
@@ -3965,7 +3958,7 @@
             </p:txBody>
           </p:sp>
         </mc:Choice>
-        <mc:Fallback>
+        <mc:Fallback xmlns="">
           <p:sp>
             <p:nvSpPr>
               <p:cNvPr id="32" name="ZoneTexte 31"/>
@@ -4004,8 +3997,8 @@
           </p:sp>
         </mc:Fallback>
       </mc:AlternateContent>
-      <mc:AlternateContent xmlns:mc="http://schemas.openxmlformats.org/markup-compatibility/2006">
-        <mc:Choice xmlns:a14="http://schemas.microsoft.com/office/drawing/2010/main" Requires="a14">
+      <mc:AlternateContent xmlns:mc="http://schemas.openxmlformats.org/markup-compatibility/2006" xmlns:a14="http://schemas.microsoft.com/office/drawing/2010/main">
+        <mc:Choice Requires="a14">
           <p:sp>
             <p:nvSpPr>
               <p:cNvPr id="33" name="ZoneTexte 32"/>
@@ -4067,7 +4060,7 @@
             </p:txBody>
           </p:sp>
         </mc:Choice>
-        <mc:Fallback>
+        <mc:Fallback xmlns="">
           <p:sp>
             <p:nvSpPr>
               <p:cNvPr id="33" name="ZoneTexte 32"/>
@@ -4250,8 +4243,8 @@
           </a:p>
         </p:txBody>
       </p:sp>
-      <mc:AlternateContent xmlns:mc="http://schemas.openxmlformats.org/markup-compatibility/2006">
-        <mc:Choice xmlns:a14="http://schemas.microsoft.com/office/drawing/2010/main" Requires="a14">
+      <mc:AlternateContent xmlns:mc="http://schemas.openxmlformats.org/markup-compatibility/2006" xmlns:a14="http://schemas.microsoft.com/office/drawing/2010/main">
+        <mc:Choice Requires="a14">
           <p:sp>
             <p:nvSpPr>
               <p:cNvPr id="49" name="ZoneTexte 48"/>
@@ -4347,7 +4340,7 @@
             </p:txBody>
           </p:sp>
         </mc:Choice>
-        <mc:Fallback>
+        <mc:Fallback xmlns="">
           <p:sp>
             <p:nvSpPr>
               <p:cNvPr id="49" name="ZoneTexte 48"/>
@@ -4386,8 +4379,8 @@
           </p:sp>
         </mc:Fallback>
       </mc:AlternateContent>
-      <mc:AlternateContent xmlns:mc="http://schemas.openxmlformats.org/markup-compatibility/2006">
-        <mc:Choice xmlns:a14="http://schemas.microsoft.com/office/drawing/2010/main" Requires="a14">
+      <mc:AlternateContent xmlns:mc="http://schemas.openxmlformats.org/markup-compatibility/2006" xmlns:a14="http://schemas.microsoft.com/office/drawing/2010/main">
+        <mc:Choice Requires="a14">
           <p:sp>
             <p:nvSpPr>
               <p:cNvPr id="50" name="ZoneTexte 49"/>
@@ -4496,7 +4489,7 @@
             </p:txBody>
           </p:sp>
         </mc:Choice>
-        <mc:Fallback>
+        <mc:Fallback xmlns="">
           <p:sp>
             <p:nvSpPr>
               <p:cNvPr id="50" name="ZoneTexte 49"/>
@@ -4535,8 +4528,8 @@
           </p:sp>
         </mc:Fallback>
       </mc:AlternateContent>
-      <mc:AlternateContent xmlns:mc="http://schemas.openxmlformats.org/markup-compatibility/2006">
-        <mc:Choice xmlns:a14="http://schemas.microsoft.com/office/drawing/2010/main" Requires="a14">
+      <mc:AlternateContent xmlns:mc="http://schemas.openxmlformats.org/markup-compatibility/2006" xmlns:a14="http://schemas.microsoft.com/office/drawing/2010/main">
+        <mc:Choice Requires="a14">
           <p:sp>
             <p:nvSpPr>
               <p:cNvPr id="51" name="ZoneTexte 50"/>
@@ -4645,7 +4638,7 @@
             </p:txBody>
           </p:sp>
         </mc:Choice>
-        <mc:Fallback>
+        <mc:Fallback xmlns="">
           <p:sp>
             <p:nvSpPr>
               <p:cNvPr id="51" name="ZoneTexte 50"/>
@@ -4684,8 +4677,8 @@
           </p:sp>
         </mc:Fallback>
       </mc:AlternateContent>
-      <mc:AlternateContent xmlns:mc="http://schemas.openxmlformats.org/markup-compatibility/2006">
-        <mc:Choice xmlns:a14="http://schemas.microsoft.com/office/drawing/2010/main" Requires="a14">
+      <mc:AlternateContent xmlns:mc="http://schemas.openxmlformats.org/markup-compatibility/2006" xmlns:a14="http://schemas.microsoft.com/office/drawing/2010/main">
+        <mc:Choice Requires="a14">
           <p:sp>
             <p:nvSpPr>
               <p:cNvPr id="52" name="ZoneTexte 51"/>
@@ -4794,7 +4787,7 @@
             </p:txBody>
           </p:sp>
         </mc:Choice>
-        <mc:Fallback>
+        <mc:Fallback xmlns="">
           <p:sp>
             <p:nvSpPr>
               <p:cNvPr id="52" name="ZoneTexte 51"/>
@@ -4833,8 +4826,8 @@
           </p:sp>
         </mc:Fallback>
       </mc:AlternateContent>
-      <mc:AlternateContent xmlns:mc="http://schemas.openxmlformats.org/markup-compatibility/2006">
-        <mc:Choice xmlns:a14="http://schemas.microsoft.com/office/drawing/2010/main" Requires="a14">
+      <mc:AlternateContent xmlns:mc="http://schemas.openxmlformats.org/markup-compatibility/2006" xmlns:a14="http://schemas.microsoft.com/office/drawing/2010/main">
+        <mc:Choice Requires="a14">
           <p:sp>
             <p:nvSpPr>
               <p:cNvPr id="53" name="ZoneTexte 52"/>
@@ -4943,7 +4936,7 @@
             </p:txBody>
           </p:sp>
         </mc:Choice>
-        <mc:Fallback>
+        <mc:Fallback xmlns="">
           <p:sp>
             <p:nvSpPr>
               <p:cNvPr id="53" name="ZoneTexte 52"/>
@@ -5115,10 +5108,6 @@
               </a:rPr>
               <a:t>b</a:t>
             </a:r>
-            <a:endParaRPr lang="fr-FR" b="1" dirty="0">
-              <a:latin typeface="Arial" panose="020B0604020202020204" pitchFamily="34" charset="0"/>
-              <a:cs typeface="Arial" panose="020B0604020202020204" pitchFamily="34" charset="0"/>
-            </a:endParaRPr>
           </a:p>
         </p:txBody>
       </p:sp>

</xml_diff>

<commit_message>
update all figures for revision
</commit_message>
<xml_diff>
--- a/outputs/00_Figures_for_paper/Figure3.pptx
+++ b/outputs/00_Figures_for_paper/Figure3.pptx
@@ -243,7 +243,7 @@
           <a:p>
             <a:fld id="{CF97A134-FB87-44B0-94D1-6D4AE8ED7871}" type="datetimeFigureOut">
               <a:rPr lang="fr-FR" smtClean="0"/>
-              <a:t>11/03/2021</a:t>
+              <a:t>16/03/2021</a:t>
             </a:fld>
             <a:endParaRPr lang="fr-FR"/>
           </a:p>
@@ -413,7 +413,7 @@
           <a:p>
             <a:fld id="{CF97A134-FB87-44B0-94D1-6D4AE8ED7871}" type="datetimeFigureOut">
               <a:rPr lang="fr-FR" smtClean="0"/>
-              <a:t>11/03/2021</a:t>
+              <a:t>16/03/2021</a:t>
             </a:fld>
             <a:endParaRPr lang="fr-FR"/>
           </a:p>
@@ -593,7 +593,7 @@
           <a:p>
             <a:fld id="{CF97A134-FB87-44B0-94D1-6D4AE8ED7871}" type="datetimeFigureOut">
               <a:rPr lang="fr-FR" smtClean="0"/>
-              <a:t>11/03/2021</a:t>
+              <a:t>16/03/2021</a:t>
             </a:fld>
             <a:endParaRPr lang="fr-FR"/>
           </a:p>
@@ -763,7 +763,7 @@
           <a:p>
             <a:fld id="{CF97A134-FB87-44B0-94D1-6D4AE8ED7871}" type="datetimeFigureOut">
               <a:rPr lang="fr-FR" smtClean="0"/>
-              <a:t>11/03/2021</a:t>
+              <a:t>16/03/2021</a:t>
             </a:fld>
             <a:endParaRPr lang="fr-FR"/>
           </a:p>
@@ -1007,7 +1007,7 @@
           <a:p>
             <a:fld id="{CF97A134-FB87-44B0-94D1-6D4AE8ED7871}" type="datetimeFigureOut">
               <a:rPr lang="fr-FR" smtClean="0"/>
-              <a:t>11/03/2021</a:t>
+              <a:t>16/03/2021</a:t>
             </a:fld>
             <a:endParaRPr lang="fr-FR"/>
           </a:p>
@@ -1239,7 +1239,7 @@
           <a:p>
             <a:fld id="{CF97A134-FB87-44B0-94D1-6D4AE8ED7871}" type="datetimeFigureOut">
               <a:rPr lang="fr-FR" smtClean="0"/>
-              <a:t>11/03/2021</a:t>
+              <a:t>16/03/2021</a:t>
             </a:fld>
             <a:endParaRPr lang="fr-FR"/>
           </a:p>
@@ -1606,7 +1606,7 @@
           <a:p>
             <a:fld id="{CF97A134-FB87-44B0-94D1-6D4AE8ED7871}" type="datetimeFigureOut">
               <a:rPr lang="fr-FR" smtClean="0"/>
-              <a:t>11/03/2021</a:t>
+              <a:t>16/03/2021</a:t>
             </a:fld>
             <a:endParaRPr lang="fr-FR"/>
           </a:p>
@@ -1724,7 +1724,7 @@
           <a:p>
             <a:fld id="{CF97A134-FB87-44B0-94D1-6D4AE8ED7871}" type="datetimeFigureOut">
               <a:rPr lang="fr-FR" smtClean="0"/>
-              <a:t>11/03/2021</a:t>
+              <a:t>16/03/2021</a:t>
             </a:fld>
             <a:endParaRPr lang="fr-FR"/>
           </a:p>
@@ -1819,7 +1819,7 @@
           <a:p>
             <a:fld id="{CF97A134-FB87-44B0-94D1-6D4AE8ED7871}" type="datetimeFigureOut">
               <a:rPr lang="fr-FR" smtClean="0"/>
-              <a:t>11/03/2021</a:t>
+              <a:t>16/03/2021</a:t>
             </a:fld>
             <a:endParaRPr lang="fr-FR"/>
           </a:p>
@@ -2096,7 +2096,7 @@
           <a:p>
             <a:fld id="{CF97A134-FB87-44B0-94D1-6D4AE8ED7871}" type="datetimeFigureOut">
               <a:rPr lang="fr-FR" smtClean="0"/>
-              <a:t>11/03/2021</a:t>
+              <a:t>16/03/2021</a:t>
             </a:fld>
             <a:endParaRPr lang="fr-FR"/>
           </a:p>
@@ -2353,7 +2353,7 @@
           <a:p>
             <a:fld id="{CF97A134-FB87-44B0-94D1-6D4AE8ED7871}" type="datetimeFigureOut">
               <a:rPr lang="fr-FR" smtClean="0"/>
-              <a:t>11/03/2021</a:t>
+              <a:t>16/03/2021</a:t>
             </a:fld>
             <a:endParaRPr lang="fr-FR"/>
           </a:p>
@@ -2566,7 +2566,7 @@
           <a:p>
             <a:fld id="{CF97A134-FB87-44B0-94D1-6D4AE8ED7871}" type="datetimeFigureOut">
               <a:rPr lang="fr-FR" smtClean="0"/>
-              <a:t>11/03/2021</a:t>
+              <a:t>16/03/2021</a:t>
             </a:fld>
             <a:endParaRPr lang="fr-FR"/>
           </a:p>
@@ -3025,10 +3025,10 @@
         </p:nvGrpSpPr>
         <p:grpSpPr>
           <a:xfrm>
-            <a:off x="224589" y="8956918"/>
-            <a:ext cx="11630713" cy="3779723"/>
-            <a:chOff x="0" y="8829967"/>
-            <a:chExt cx="11853158" cy="3779723"/>
+            <a:off x="256009" y="8873319"/>
+            <a:ext cx="9930565" cy="4560495"/>
+            <a:chOff x="32021" y="8746368"/>
+            <a:chExt cx="10120494" cy="4560495"/>
           </a:xfrm>
         </p:grpSpPr>
         <p:pic>
@@ -3053,8 +3053,8 @@
           </p:blipFill>
           <p:spPr>
             <a:xfrm>
-              <a:off x="0" y="8829967"/>
-              <a:ext cx="11853158" cy="3779723"/>
+              <a:off x="32021" y="8746368"/>
+              <a:ext cx="10120494" cy="4560495"/>
             </a:xfrm>
             <a:prstGeom prst="rect">
               <a:avLst/>
@@ -3069,7 +3069,7 @@
           </p:nvSpPr>
           <p:spPr>
             <a:xfrm>
-              <a:off x="490491" y="9120877"/>
+              <a:off x="421290" y="9130118"/>
               <a:ext cx="308397" cy="261610"/>
             </a:xfrm>
             <a:prstGeom prst="rect">
@@ -3126,28 +3126,7 @@
                 <a:latin typeface="Arial" panose="020B0604020202020204" pitchFamily="34" charset="0"/>
                 <a:cs typeface="Arial" panose="020B0604020202020204" pitchFamily="34" charset="0"/>
               </a:rPr>
-              <a:t>Western </a:t>
-            </a:r>
-            <a:r>
-              <a:rPr lang="fr-FR" sz="1400" b="1" dirty="0" err="1" smtClean="0">
-                <a:latin typeface="Arial" panose="020B0604020202020204" pitchFamily="34" charset="0"/>
-                <a:cs typeface="Arial" panose="020B0604020202020204" pitchFamily="34" charset="0"/>
-              </a:rPr>
-              <a:t>Indian</a:t>
-            </a:r>
-            <a:r>
-              <a:rPr lang="fr-FR" sz="1400" b="1" dirty="0" smtClean="0">
-                <a:latin typeface="Arial" panose="020B0604020202020204" pitchFamily="34" charset="0"/>
-                <a:cs typeface="Arial" panose="020B0604020202020204" pitchFamily="34" charset="0"/>
-              </a:rPr>
-              <a:t> </a:t>
-            </a:r>
-            <a:r>
-              <a:rPr lang="fr-FR" sz="1400" b="1" dirty="0" err="1" smtClean="0">
-                <a:latin typeface="Arial" panose="020B0604020202020204" pitchFamily="34" charset="0"/>
-                <a:cs typeface="Arial" panose="020B0604020202020204" pitchFamily="34" charset="0"/>
-              </a:rPr>
-              <a:t>Ocean</a:t>
+              <a:t>Western Indian Ocean</a:t>
             </a:r>
             <a:endParaRPr lang="fr-FR" sz="1400" b="1" dirty="0">
               <a:latin typeface="Arial" panose="020B0604020202020204" pitchFamily="34" charset="0"/>
@@ -3184,21 +3163,7 @@
                 <a:latin typeface="Arial" panose="020B0604020202020204" pitchFamily="34" charset="0"/>
                 <a:cs typeface="Arial" panose="020B0604020202020204" pitchFamily="34" charset="0"/>
               </a:rPr>
-              <a:t>Western </a:t>
-            </a:r>
-            <a:r>
-              <a:rPr lang="fr-FR" sz="1400" b="1" dirty="0" err="1" smtClean="0">
-                <a:latin typeface="Arial" panose="020B0604020202020204" pitchFamily="34" charset="0"/>
-                <a:cs typeface="Arial" panose="020B0604020202020204" pitchFamily="34" charset="0"/>
-              </a:rPr>
-              <a:t>Coral</a:t>
-            </a:r>
-            <a:r>
-              <a:rPr lang="fr-FR" sz="1400" b="1" dirty="0" smtClean="0">
-                <a:latin typeface="Arial" panose="020B0604020202020204" pitchFamily="34" charset="0"/>
-                <a:cs typeface="Arial" panose="020B0604020202020204" pitchFamily="34" charset="0"/>
-              </a:rPr>
-              <a:t> Triangle</a:t>
+              <a:t>Western Coral Triangle</a:t>
             </a:r>
             <a:endParaRPr lang="fr-FR" sz="1400" b="1" dirty="0">
               <a:latin typeface="Arial" panose="020B0604020202020204" pitchFamily="34" charset="0"/>
@@ -3268,25 +3233,11 @@
           <a:p>
             <a:pPr algn="ctr"/>
             <a:r>
-              <a:rPr lang="fr-FR" sz="1400" b="1" dirty="0" err="1" smtClean="0">
-                <a:latin typeface="Arial" panose="020B0604020202020204" pitchFamily="34" charset="0"/>
-                <a:cs typeface="Arial" panose="020B0604020202020204" pitchFamily="34" charset="0"/>
-              </a:rPr>
-              <a:t>Southeast</a:t>
-            </a:r>
-            <a:r>
               <a:rPr lang="fr-FR" sz="1400" b="1" dirty="0" smtClean="0">
                 <a:latin typeface="Arial" panose="020B0604020202020204" pitchFamily="34" charset="0"/>
                 <a:cs typeface="Arial" panose="020B0604020202020204" pitchFamily="34" charset="0"/>
               </a:rPr>
-              <a:t> </a:t>
-            </a:r>
-            <a:r>
-              <a:rPr lang="fr-FR" sz="1400" b="1" dirty="0" err="1" smtClean="0">
-                <a:latin typeface="Arial" panose="020B0604020202020204" pitchFamily="34" charset="0"/>
-                <a:cs typeface="Arial" panose="020B0604020202020204" pitchFamily="34" charset="0"/>
-              </a:rPr>
-              <a:t>Polynesia</a:t>
+              <a:t>Southeast Polynesia</a:t>
             </a:r>
             <a:endParaRPr lang="fr-FR" sz="1400" b="1" dirty="0">
               <a:latin typeface="Arial" panose="020B0604020202020204" pitchFamily="34" charset="0"/>
@@ -3485,14 +3436,7 @@
                 <a:latin typeface="Arial" panose="020B0604020202020204" pitchFamily="34" charset="0"/>
                 <a:cs typeface="Arial" panose="020B0604020202020204" pitchFamily="34" charset="0"/>
               </a:rPr>
-              <a:t>8 </a:t>
-            </a:r>
-            <a:r>
-              <a:rPr lang="fr-FR" sz="1200" i="1" dirty="0" smtClean="0">
-                <a:latin typeface="Arial" panose="020B0604020202020204" pitchFamily="34" charset="0"/>
-                <a:cs typeface="Arial" panose="020B0604020202020204" pitchFamily="34" charset="0"/>
-              </a:rPr>
-              <a:t>stations</a:t>
+              <a:t>8 stations</a:t>
             </a:r>
             <a:endParaRPr lang="fr-FR" sz="1200" i="1" dirty="0">
               <a:latin typeface="Arial" panose="020B0604020202020204" pitchFamily="34" charset="0"/>
@@ -3624,7 +3568,7 @@
         </p:nvSpPr>
         <p:spPr>
           <a:xfrm>
-            <a:off x="11179937" y="8768668"/>
+            <a:off x="9569848" y="8755398"/>
             <a:ext cx="257839" cy="338554"/>
           </a:xfrm>
           <a:prstGeom prst="rect">
@@ -3652,8 +3596,8 @@
           </a:p>
         </p:txBody>
       </p:sp>
-      <mc:AlternateContent xmlns:mc="http://schemas.openxmlformats.org/markup-compatibility/2006" xmlns:a14="http://schemas.microsoft.com/office/drawing/2010/main">
-        <mc:Choice Requires="a14">
+      <mc:AlternateContent xmlns:mc="http://schemas.openxmlformats.org/markup-compatibility/2006">
+        <mc:Choice xmlns:a14="http://schemas.microsoft.com/office/drawing/2010/main" Requires="a14">
           <p:sp>
             <p:nvSpPr>
               <p:cNvPr id="30" name="ZoneTexte 29"/>
@@ -3662,7 +3606,7 @@
             </p:nvSpPr>
             <p:spPr>
               <a:xfrm>
-                <a:off x="8452552" y="9284932"/>
+                <a:off x="7202626" y="9315754"/>
                 <a:ext cx="392158" cy="338554"/>
               </a:xfrm>
               <a:prstGeom prst="rect">
@@ -3720,7 +3664,7 @@
             </p:txBody>
           </p:sp>
         </mc:Choice>
-        <mc:Fallback xmlns="">
+        <mc:Fallback>
           <p:sp>
             <p:nvSpPr>
               <p:cNvPr id="30" name="ZoneTexte 29"/>
@@ -3731,7 +3675,7 @@
             </p:nvSpPr>
             <p:spPr>
               <a:xfrm>
-                <a:off x="8452552" y="9284932"/>
+                <a:off x="7202626" y="9315754"/>
                 <a:ext cx="392158" cy="338554"/>
               </a:xfrm>
               <a:prstGeom prst="rect">
@@ -3759,8 +3703,8 @@
           </p:sp>
         </mc:Fallback>
       </mc:AlternateContent>
-      <mc:AlternateContent xmlns:mc="http://schemas.openxmlformats.org/markup-compatibility/2006" xmlns:a14="http://schemas.microsoft.com/office/drawing/2010/main">
-        <mc:Choice Requires="a14">
+      <mc:AlternateContent xmlns:mc="http://schemas.openxmlformats.org/markup-compatibility/2006">
+        <mc:Choice xmlns:a14="http://schemas.microsoft.com/office/drawing/2010/main" Requires="a14">
           <p:sp>
             <p:nvSpPr>
               <p:cNvPr id="31" name="ZoneTexte 30"/>
@@ -3769,7 +3713,7 @@
             </p:nvSpPr>
             <p:spPr>
               <a:xfrm>
-                <a:off x="2089242" y="9955013"/>
+                <a:off x="1887223" y="10120390"/>
                 <a:ext cx="392158" cy="344133"/>
               </a:xfrm>
               <a:prstGeom prst="rect">
@@ -3839,7 +3783,7 @@
             </p:txBody>
           </p:sp>
         </mc:Choice>
-        <mc:Fallback xmlns="">
+        <mc:Fallback>
           <p:sp>
             <p:nvSpPr>
               <p:cNvPr id="31" name="ZoneTexte 30"/>
@@ -3850,7 +3794,7 @@
             </p:nvSpPr>
             <p:spPr>
               <a:xfrm>
-                <a:off x="2089242" y="9955013"/>
+                <a:off x="1887223" y="10120390"/>
                 <a:ext cx="392158" cy="344133"/>
               </a:xfrm>
               <a:prstGeom prst="rect">
@@ -3859,7 +3803,7 @@
               <a:blipFill>
                 <a:blip r:embed="rId4"/>
                 <a:stretch>
-                  <a:fillRect l="-1563" b="-12500"/>
+                  <a:fillRect l="-1563" b="-10526"/>
                 </a:stretch>
               </a:blipFill>
             </p:spPr>
@@ -3878,8 +3822,8 @@
           </p:sp>
         </mc:Fallback>
       </mc:AlternateContent>
-      <mc:AlternateContent xmlns:mc="http://schemas.openxmlformats.org/markup-compatibility/2006" xmlns:a14="http://schemas.microsoft.com/office/drawing/2010/main">
-        <mc:Choice Requires="a14">
+      <mc:AlternateContent xmlns:mc="http://schemas.openxmlformats.org/markup-compatibility/2006">
+        <mc:Choice xmlns:a14="http://schemas.microsoft.com/office/drawing/2010/main" Requires="a14">
           <p:sp>
             <p:nvSpPr>
               <p:cNvPr id="32" name="ZoneTexte 31"/>
@@ -3888,7 +3832,7 @@
             </p:nvSpPr>
             <p:spPr>
               <a:xfrm>
-                <a:off x="1351269" y="10785263"/>
+                <a:off x="1052878" y="11153566"/>
                 <a:ext cx="392158" cy="344133"/>
               </a:xfrm>
               <a:prstGeom prst="rect">
@@ -3958,7 +3902,7 @@
             </p:txBody>
           </p:sp>
         </mc:Choice>
-        <mc:Fallback xmlns="">
+        <mc:Fallback>
           <p:sp>
             <p:nvSpPr>
               <p:cNvPr id="32" name="ZoneTexte 31"/>
@@ -3969,7 +3913,7 @@
             </p:nvSpPr>
             <p:spPr>
               <a:xfrm>
-                <a:off x="1351269" y="10785263"/>
+                <a:off x="1052878" y="11153566"/>
                 <a:ext cx="392158" cy="344133"/>
               </a:xfrm>
               <a:prstGeom prst="rect">
@@ -3978,7 +3922,7 @@
               <a:blipFill>
                 <a:blip r:embed="rId5"/>
                 <a:stretch>
-                  <a:fillRect l="-1563" r="-6250" b="-10526"/>
+                  <a:fillRect l="-1563" r="-6250" b="-12500"/>
                 </a:stretch>
               </a:blipFill>
             </p:spPr>
@@ -3997,8 +3941,8 @@
           </p:sp>
         </mc:Fallback>
       </mc:AlternateContent>
-      <mc:AlternateContent xmlns:mc="http://schemas.openxmlformats.org/markup-compatibility/2006" xmlns:a14="http://schemas.microsoft.com/office/drawing/2010/main">
-        <mc:Choice Requires="a14">
+      <mc:AlternateContent xmlns:mc="http://schemas.openxmlformats.org/markup-compatibility/2006">
+        <mc:Choice xmlns:a14="http://schemas.microsoft.com/office/drawing/2010/main" Requires="a14">
           <p:sp>
             <p:nvSpPr>
               <p:cNvPr id="33" name="ZoneTexte 32"/>
@@ -4007,7 +3951,7 @@
             </p:nvSpPr>
             <p:spPr>
               <a:xfrm>
-                <a:off x="1076744" y="11671604"/>
+                <a:off x="1021455" y="12179829"/>
                 <a:ext cx="392158" cy="338554"/>
               </a:xfrm>
               <a:prstGeom prst="rect">
@@ -4060,7 +4004,7 @@
             </p:txBody>
           </p:sp>
         </mc:Choice>
-        <mc:Fallback xmlns="">
+        <mc:Fallback>
           <p:sp>
             <p:nvSpPr>
               <p:cNvPr id="33" name="ZoneTexte 32"/>
@@ -4071,7 +4015,7 @@
             </p:nvSpPr>
             <p:spPr>
               <a:xfrm>
-                <a:off x="1076744" y="11671604"/>
+                <a:off x="1021455" y="12179829"/>
                 <a:ext cx="392158" cy="338554"/>
               </a:xfrm>
               <a:prstGeom prst="rect">
@@ -4107,7 +4051,7 @@
         </p:nvSpPr>
         <p:spPr>
           <a:xfrm>
-            <a:off x="705875" y="9719598"/>
+            <a:off x="642892" y="9824840"/>
             <a:ext cx="302609" cy="261610"/>
           </a:xfrm>
           <a:prstGeom prst="rect">
@@ -4143,7 +4087,7 @@
         </p:nvSpPr>
         <p:spPr>
           <a:xfrm>
-            <a:off x="695493" y="10682317"/>
+            <a:off x="637974" y="10977228"/>
             <a:ext cx="302609" cy="261610"/>
           </a:xfrm>
           <a:prstGeom prst="rect">
@@ -4179,7 +4123,7 @@
         </p:nvSpPr>
         <p:spPr>
           <a:xfrm>
-            <a:off x="706074" y="11534107"/>
+            <a:off x="643457" y="12019816"/>
             <a:ext cx="302609" cy="261610"/>
           </a:xfrm>
           <a:prstGeom prst="rect">
@@ -4215,7 +4159,7 @@
         </p:nvSpPr>
         <p:spPr>
           <a:xfrm>
-            <a:off x="706074" y="12359587"/>
+            <a:off x="643236" y="13003403"/>
             <a:ext cx="252666" cy="261610"/>
           </a:xfrm>
           <a:prstGeom prst="rect">
@@ -4243,8 +4187,8 @@
           </a:p>
         </p:txBody>
       </p:sp>
-      <mc:AlternateContent xmlns:mc="http://schemas.openxmlformats.org/markup-compatibility/2006" xmlns:a14="http://schemas.microsoft.com/office/drawing/2010/main">
-        <mc:Choice Requires="a14">
+      <mc:AlternateContent xmlns:mc="http://schemas.openxmlformats.org/markup-compatibility/2006">
+        <mc:Choice xmlns:a14="http://schemas.microsoft.com/office/drawing/2010/main" Requires="a14">
           <p:sp>
             <p:nvSpPr>
               <p:cNvPr id="49" name="ZoneTexte 48"/>
@@ -4253,8 +4197,8 @@
             </p:nvSpPr>
             <p:spPr>
               <a:xfrm>
-                <a:off x="9179542" y="9370671"/>
-                <a:ext cx="2900164" cy="361894"/>
+                <a:off x="10022771" y="9032198"/>
+                <a:ext cx="1878318" cy="577338"/>
               </a:xfrm>
               <a:prstGeom prst="rect">
                 <a:avLst/>
@@ -4267,6 +4211,7 @@
               </a:bodyPr>
               <a:lstStyle/>
               <a:p>
+                <a:pPr algn="ctr"/>
                 <a14:m>
                   <m:oMath xmlns:m="http://schemas.openxmlformats.org/officeDocument/2006/math">
                     <m:sSub>
@@ -4320,18 +4265,28 @@
                     <a:latin typeface="Arial" panose="020B0604020202020204" pitchFamily="34" charset="0"/>
                     <a:cs typeface="Arial" panose="020B0604020202020204" pitchFamily="34" charset="0"/>
                   </a:rPr>
-                  <a:t> (</a:t>
-                </a:r>
-                <a:r>
-                  <a:rPr lang="fr-FR" sz="1400" b="1" dirty="0">
-                    <a:latin typeface="Arial" panose="020B0604020202020204" pitchFamily="34" charset="0"/>
-                    <a:cs typeface="Arial" panose="020B0604020202020204" pitchFamily="34" charset="0"/>
-                  </a:rPr>
-                  <a:t>2160 </a:t>
+                  <a:t> </a:t>
                 </a:r>
                 <a:r>
                   <a:rPr lang="fr-FR" sz="1400" b="1" dirty="0" smtClean="0">
-                    <a:latin typeface="Arial" panose="020B0604020202020204" pitchFamily="34" charset="0"/>
+                    <a:latin typeface="Cambria Math" panose="02040503050406030204" pitchFamily="18" charset="0"/>
+                    <a:ea typeface="Cambria Math" panose="02040503050406030204" pitchFamily="18" charset="0"/>
+                    <a:cs typeface="Arial" panose="020B0604020202020204" pitchFamily="34" charset="0"/>
+                  </a:rPr>
+                  <a:t>(</a:t>
+                </a:r>
+                <a:r>
+                  <a:rPr lang="fr-FR" sz="1400" b="1" dirty="0" smtClean="0">
+                    <a:latin typeface="Cambria Math" panose="02040503050406030204" pitchFamily="18" charset="0"/>
+                    <a:ea typeface="Cambria Math" panose="02040503050406030204" pitchFamily="18" charset="0"/>
+                    <a:cs typeface="Arial" panose="020B0604020202020204" pitchFamily="34" charset="0"/>
+                  </a:rPr>
+                  <a:t>2116 </a:t>
+                </a:r>
+                <a:r>
+                  <a:rPr lang="fr-FR" sz="1400" b="1" dirty="0" smtClean="0">
+                    <a:latin typeface="Cambria Math" panose="02040503050406030204" pitchFamily="18" charset="0"/>
+                    <a:ea typeface="Cambria Math" panose="02040503050406030204" pitchFamily="18" charset="0"/>
                     <a:cs typeface="Arial" panose="020B0604020202020204" pitchFamily="34" charset="0"/>
                   </a:rPr>
                   <a:t>MOTUs)</a:t>
@@ -4340,7 +4295,7 @@
             </p:txBody>
           </p:sp>
         </mc:Choice>
-        <mc:Fallback xmlns="">
+        <mc:Fallback>
           <p:sp>
             <p:nvSpPr>
               <p:cNvPr id="49" name="ZoneTexte 48"/>
@@ -4351,8 +4306,8 @@
             </p:nvSpPr>
             <p:spPr>
               <a:xfrm>
-                <a:off x="9179542" y="9370671"/>
-                <a:ext cx="2900164" cy="361894"/>
+                <a:off x="10022771" y="9032198"/>
+                <a:ext cx="1878318" cy="577338"/>
               </a:xfrm>
               <a:prstGeom prst="rect">
                 <a:avLst/>
@@ -4360,7 +4315,7 @@
               <a:blipFill>
                 <a:blip r:embed="rId7"/>
                 <a:stretch>
-                  <a:fillRect b="-8333"/>
+                  <a:fillRect b="-9574"/>
                 </a:stretch>
               </a:blipFill>
             </p:spPr>
@@ -4379,8 +4334,8 @@
           </p:sp>
         </mc:Fallback>
       </mc:AlternateContent>
-      <mc:AlternateContent xmlns:mc="http://schemas.openxmlformats.org/markup-compatibility/2006" xmlns:a14="http://schemas.microsoft.com/office/drawing/2010/main">
-        <mc:Choice Requires="a14">
+      <mc:AlternateContent xmlns:mc="http://schemas.openxmlformats.org/markup-compatibility/2006">
+        <mc:Choice xmlns:a14="http://schemas.microsoft.com/office/drawing/2010/main" Requires="a14">
           <p:sp>
             <p:nvSpPr>
               <p:cNvPr id="50" name="ZoneTexte 49"/>
@@ -4389,7 +4344,7 @@
             </p:nvSpPr>
             <p:spPr>
               <a:xfrm>
-                <a:off x="9698768" y="9917597"/>
+                <a:off x="9698767" y="9692772"/>
                 <a:ext cx="2380937" cy="361894"/>
               </a:xfrm>
               <a:prstGeom prst="rect">
@@ -4464,18 +4419,6 @@
                         <a:rPr lang="fr-FR" sz="1600" b="1" i="1" smtClean="0">
                           <a:latin typeface="Cambria Math" panose="02040503050406030204" pitchFamily="18" charset="0"/>
                         </a:rPr>
-                        <m:t>.</m:t>
-                      </m:r>
-                      <m:r>
-                        <a:rPr lang="fr-FR" sz="1600" b="1" i="1" smtClean="0">
-                          <a:latin typeface="Cambria Math" panose="02040503050406030204" pitchFamily="18" charset="0"/>
-                        </a:rPr>
-                        <m:t>𝟓</m:t>
-                      </m:r>
-                      <m:r>
-                        <a:rPr lang="fr-FR" sz="1600" b="1" i="1" smtClean="0">
-                          <a:latin typeface="Cambria Math" panose="02040503050406030204" pitchFamily="18" charset="0"/>
-                        </a:rPr>
                         <m:t> %</m:t>
                       </m:r>
                     </m:oMath>
@@ -4489,7 +4432,7 @@
             </p:txBody>
           </p:sp>
         </mc:Choice>
-        <mc:Fallback xmlns="">
+        <mc:Fallback>
           <p:sp>
             <p:nvSpPr>
               <p:cNvPr id="50" name="ZoneTexte 49"/>
@@ -4500,7 +4443,7 @@
             </p:nvSpPr>
             <p:spPr>
               <a:xfrm>
-                <a:off x="9698768" y="9917597"/>
+                <a:off x="9698767" y="9692772"/>
                 <a:ext cx="2380937" cy="361894"/>
               </a:xfrm>
               <a:prstGeom prst="rect">
@@ -4509,7 +4452,7 @@
               <a:blipFill>
                 <a:blip r:embed="rId8"/>
                 <a:stretch>
-                  <a:fillRect b="-5085"/>
+                  <a:fillRect b="-6780"/>
                 </a:stretch>
               </a:blipFill>
             </p:spPr>
@@ -4528,8 +4471,8 @@
           </p:sp>
         </mc:Fallback>
       </mc:AlternateContent>
-      <mc:AlternateContent xmlns:mc="http://schemas.openxmlformats.org/markup-compatibility/2006" xmlns:a14="http://schemas.microsoft.com/office/drawing/2010/main">
-        <mc:Choice Requires="a14">
+      <mc:AlternateContent xmlns:mc="http://schemas.openxmlformats.org/markup-compatibility/2006">
+        <mc:Choice xmlns:a14="http://schemas.microsoft.com/office/drawing/2010/main" Requires="a14">
           <p:sp>
             <p:nvSpPr>
               <p:cNvPr id="51" name="ZoneTexte 50"/>
@@ -4538,8 +4481,8 @@
             </p:nvSpPr>
             <p:spPr>
               <a:xfrm>
-                <a:off x="9698768" y="10464523"/>
-                <a:ext cx="1929858" cy="344133"/>
+                <a:off x="9698767" y="10403682"/>
+                <a:ext cx="2016982" cy="344133"/>
               </a:xfrm>
               <a:prstGeom prst="rect">
                 <a:avLst/>
@@ -4625,6 +4568,18 @@
                         <a:rPr lang="fr-FR" sz="1600" b="1" i="1" smtClean="0">
                           <a:latin typeface="Cambria Math" panose="02040503050406030204" pitchFamily="18" charset="0"/>
                         </a:rPr>
+                        <m:t>.</m:t>
+                      </m:r>
+                      <m:r>
+                        <a:rPr lang="fr-FR" sz="1600" b="1" i="1" smtClean="0">
+                          <a:latin typeface="Cambria Math" panose="02040503050406030204" pitchFamily="18" charset="0"/>
+                        </a:rPr>
+                        <m:t>𝟓</m:t>
+                      </m:r>
+                      <m:r>
+                        <a:rPr lang="fr-FR" sz="1600" b="1" i="1" smtClean="0">
+                          <a:latin typeface="Cambria Math" panose="02040503050406030204" pitchFamily="18" charset="0"/>
+                        </a:rPr>
                         <m:t> %</m:t>
                       </m:r>
                     </m:oMath>
@@ -4638,7 +4593,7 @@
             </p:txBody>
           </p:sp>
         </mc:Choice>
-        <mc:Fallback xmlns="">
+        <mc:Fallback>
           <p:sp>
             <p:nvSpPr>
               <p:cNvPr id="51" name="ZoneTexte 50"/>
@@ -4649,8 +4604,8 @@
             </p:nvSpPr>
             <p:spPr>
               <a:xfrm>
-                <a:off x="9698768" y="10464523"/>
-                <a:ext cx="1929858" cy="344133"/>
+                <a:off x="9698767" y="10403682"/>
+                <a:ext cx="2016982" cy="344133"/>
               </a:xfrm>
               <a:prstGeom prst="rect">
                 <a:avLst/>
@@ -4677,8 +4632,8 @@
           </p:sp>
         </mc:Fallback>
       </mc:AlternateContent>
-      <mc:AlternateContent xmlns:mc="http://schemas.openxmlformats.org/markup-compatibility/2006" xmlns:a14="http://schemas.microsoft.com/office/drawing/2010/main">
-        <mc:Choice Requires="a14">
+      <mc:AlternateContent xmlns:mc="http://schemas.openxmlformats.org/markup-compatibility/2006">
+        <mc:Choice xmlns:a14="http://schemas.microsoft.com/office/drawing/2010/main" Requires="a14">
           <p:sp>
             <p:nvSpPr>
               <p:cNvPr id="52" name="ZoneTexte 51"/>
@@ -4687,8 +4642,8 @@
             </p:nvSpPr>
             <p:spPr>
               <a:xfrm>
-                <a:off x="9698768" y="11195551"/>
-                <a:ext cx="2016982" cy="344133"/>
+                <a:off x="9698767" y="11346278"/>
+                <a:ext cx="2268643" cy="344133"/>
               </a:xfrm>
               <a:prstGeom prst="rect">
                 <a:avLst/>
@@ -4768,7 +4723,19 @@
                         <a:rPr lang="fr-FR" sz="1600" b="1" i="1" smtClean="0">
                           <a:latin typeface="Cambria Math" panose="02040503050406030204" pitchFamily="18" charset="0"/>
                         </a:rPr>
-                        <m:t>𝟕</m:t>
+                        <m:t>𝟔</m:t>
+                      </m:r>
+                      <m:r>
+                        <a:rPr lang="fr-FR" sz="1600" b="1" i="1" smtClean="0">
+                          <a:latin typeface="Cambria Math" panose="02040503050406030204" pitchFamily="18" charset="0"/>
+                        </a:rPr>
+                        <m:t>.</m:t>
+                      </m:r>
+                      <m:r>
+                        <a:rPr lang="fr-FR" sz="1600" b="1" i="1" smtClean="0">
+                          <a:latin typeface="Cambria Math" panose="02040503050406030204" pitchFamily="18" charset="0"/>
+                        </a:rPr>
+                        <m:t>𝟐</m:t>
                       </m:r>
                       <m:r>
                         <a:rPr lang="fr-FR" sz="1600" b="1" i="1" smtClean="0">
@@ -4787,7 +4754,7 @@
             </p:txBody>
           </p:sp>
         </mc:Choice>
-        <mc:Fallback xmlns="">
+        <mc:Fallback>
           <p:sp>
             <p:nvSpPr>
               <p:cNvPr id="52" name="ZoneTexte 51"/>
@@ -4798,8 +4765,8 @@
             </p:nvSpPr>
             <p:spPr>
               <a:xfrm>
-                <a:off x="9698768" y="11195551"/>
-                <a:ext cx="2016982" cy="344133"/>
+                <a:off x="9698767" y="11346278"/>
+                <a:ext cx="2268643" cy="344133"/>
               </a:xfrm>
               <a:prstGeom prst="rect">
                 <a:avLst/>
@@ -4807,7 +4774,7 @@
               <a:blipFill>
                 <a:blip r:embed="rId10"/>
                 <a:stretch>
-                  <a:fillRect b="-12500"/>
+                  <a:fillRect b="-10526"/>
                 </a:stretch>
               </a:blipFill>
             </p:spPr>
@@ -4826,8 +4793,8 @@
           </p:sp>
         </mc:Fallback>
       </mc:AlternateContent>
-      <mc:AlternateContent xmlns:mc="http://schemas.openxmlformats.org/markup-compatibility/2006" xmlns:a14="http://schemas.microsoft.com/office/drawing/2010/main">
-        <mc:Choice Requires="a14">
+      <mc:AlternateContent xmlns:mc="http://schemas.openxmlformats.org/markup-compatibility/2006">
+        <mc:Choice xmlns:a14="http://schemas.microsoft.com/office/drawing/2010/main" Requires="a14">
           <p:sp>
             <p:nvSpPr>
               <p:cNvPr id="53" name="ZoneTexte 52"/>
@@ -4836,7 +4803,7 @@
             </p:nvSpPr>
             <p:spPr>
               <a:xfrm>
-                <a:off x="9698768" y="11924473"/>
+                <a:off x="9698767" y="12203303"/>
                 <a:ext cx="1790819" cy="338554"/>
               </a:xfrm>
               <a:prstGeom prst="rect">
@@ -4905,7 +4872,7 @@
                         <a:rPr lang="fr-FR" sz="1600" b="1" i="1" smtClean="0">
                           <a:latin typeface="Cambria Math" panose="02040503050406030204" pitchFamily="18" charset="0"/>
                         </a:rPr>
-                        <m:t>𝟒</m:t>
+                        <m:t>𝟓</m:t>
                       </m:r>
                       <m:r>
                         <a:rPr lang="fr-FR" sz="1600" b="1" i="1" smtClean="0">
@@ -4917,7 +4884,7 @@
                         <a:rPr lang="fr-FR" sz="1600" b="1" i="1" smtClean="0">
                           <a:latin typeface="Cambria Math" panose="02040503050406030204" pitchFamily="18" charset="0"/>
                         </a:rPr>
-                        <m:t>𝟓</m:t>
+                        <m:t>𝟑</m:t>
                       </m:r>
                       <m:r>
                         <a:rPr lang="fr-FR" sz="1600" b="1" i="1" smtClean="0">
@@ -4936,7 +4903,7 @@
             </p:txBody>
           </p:sp>
         </mc:Choice>
-        <mc:Fallback xmlns="">
+        <mc:Fallback>
           <p:sp>
             <p:nvSpPr>
               <p:cNvPr id="53" name="ZoneTexte 52"/>
@@ -4947,7 +4914,7 @@
             </p:nvSpPr>
             <p:spPr>
               <a:xfrm>
-                <a:off x="9698768" y="11924473"/>
+                <a:off x="9698767" y="12203303"/>
                 <a:ext cx="1790819" cy="338554"/>
               </a:xfrm>
               <a:prstGeom prst="rect">
@@ -4983,15 +4950,13 @@
         </p:nvSpPr>
         <p:spPr>
           <a:xfrm>
-            <a:off x="11360487" y="9114084"/>
+            <a:off x="9406780" y="9328027"/>
             <a:ext cx="682313" cy="261610"/>
           </a:xfrm>
           <a:prstGeom prst="rect">
             <a:avLst/>
           </a:prstGeom>
-          <a:solidFill>
-            <a:schemeClr val="bg1"/>
-          </a:solidFill>
+          <a:noFill/>
         </p:spPr>
         <p:txBody>
           <a:bodyPr wrap="square" rtlCol="0">
@@ -5035,8 +5000,8 @@
         </p:blipFill>
         <p:spPr>
           <a:xfrm>
-            <a:off x="765365" y="441046"/>
-            <a:ext cx="10573812" cy="5617624"/>
+            <a:off x="509534" y="530878"/>
+            <a:ext cx="10829643" cy="5569530"/>
           </a:xfrm>
           <a:prstGeom prst="rect">
             <a:avLst/>

</xml_diff>